<commit_message>
update demo app and powerpoin
</commit_message>
<xml_diff>
--- a/pennapps-nodejs-workshop.pptx
+++ b/pennapps-nodejs-workshop.pptx
@@ -5769,7 +5769,23 @@
             </a:r>
             <a:r>
               <a:rPr lang="en-US" dirty="0"/>
-              <a:t>use a gem, pass the name of the gem as a string to the </a:t>
+              <a:t>use a </a:t>
+            </a:r>
+            <a:r>
+              <a:rPr lang="en-US" dirty="0" smtClean="0"/>
+              <a:t>package, </a:t>
+            </a:r>
+            <a:r>
+              <a:rPr lang="en-US" dirty="0"/>
+              <a:t>pass the name of the </a:t>
+            </a:r>
+            <a:r>
+              <a:rPr lang="en-US" dirty="0" smtClean="0"/>
+              <a:t>package as </a:t>
+            </a:r>
+            <a:r>
+              <a:rPr lang="en-US" dirty="0"/>
+              <a:t>a string to the </a:t>
             </a:r>
             <a:r>
               <a:rPr lang="en-US" dirty="0" smtClean="0">

</xml_diff>

<commit_message>
update rvm to nvm in powerpoint
</commit_message>
<xml_diff>
--- a/pennapps-nodejs-workshop.pptx
+++ b/pennapps-nodejs-workshop.pptx
@@ -249,7 +249,7 @@
           <a:p>
             <a:fld id="{B06E1C6C-4C99-B941-A033-2F233E88372B}" type="datetimeFigureOut">
               <a:rPr lang="en-US" smtClean="0"/>
-              <a:t>9/9/16</a:t>
+              <a:t>9/10/16</a:t>
             </a:fld>
             <a:endParaRPr lang="en-US"/>
           </a:p>
@@ -415,7 +415,7 @@
           <a:p>
             <a:fld id="{39636A98-17E3-2D40-AC23-AD56D5C9F209}" type="datetimeFigureOut">
               <a:rPr lang="en-US" smtClean="0"/>
-              <a:t>9/9/16</a:t>
+              <a:t>9/10/16</a:t>
             </a:fld>
             <a:endParaRPr lang="en-US"/>
           </a:p>
@@ -5736,11 +5736,7 @@
             </a:r>
             <a:r>
               <a:rPr lang="en-US" dirty="0" smtClean="0"/>
-              <a:t>package</a:t>
-            </a:r>
-            <a:r>
-              <a:rPr lang="en-US" dirty="0" smtClean="0"/>
-              <a:t> </a:t>
+              <a:t>package </a:t>
             </a:r>
             <a:r>
               <a:rPr lang="en-US" dirty="0"/>
@@ -5796,11 +5792,7 @@
             </a:r>
             <a:r>
               <a:rPr lang="en-US" dirty="0" smtClean="0"/>
-              <a:t> </a:t>
-            </a:r>
-            <a:r>
-              <a:rPr lang="en-US" dirty="0" smtClean="0"/>
-              <a:t>function at </a:t>
+              <a:t> function at </a:t>
             </a:r>
             <a:r>
               <a:rPr lang="en-US" dirty="0"/>
@@ -12430,13 +12422,8 @@
             </a:pPr>
             <a:r>
               <a:rPr lang="en-US" sz="4000" dirty="0" smtClean="0"/>
-              <a:t>Intro to the </a:t>
-            </a:r>
-            <a:r>
-              <a:rPr lang="en-US" sz="4000" dirty="0" smtClean="0"/>
-              <a:t>Web</a:t>
-            </a:r>
-            <a:endParaRPr lang="en-US" sz="4000" dirty="0" smtClean="0"/>
+              <a:t>Intro to the Web</a:t>
+            </a:r>
           </a:p>
           <a:p>
             <a:pPr marL="514350" indent="-514350">
@@ -13600,9 +13587,6 @@
               </a:rPr>
               <a:t>()</a:t>
             </a:r>
-            <a:endParaRPr lang="en-US" sz="2400" dirty="0">
-              <a:latin typeface="Courier" charset="0"/>
-            </a:endParaRPr>
           </a:p>
         </p:txBody>
       </p:sp>
@@ -15506,7 +15490,6 @@
               <a:rPr lang="en-US" dirty="0"/>
               <a:t>can be done with some middleware:</a:t>
             </a:r>
-            <a:endParaRPr lang="en-US" dirty="0"/>
           </a:p>
         </p:txBody>
       </p:sp>
@@ -16024,7 +16007,6 @@
               <a:rPr lang="en-US" dirty="0"/>
               <a:t>can also pass in more local variables at call time</a:t>
             </a:r>
-            <a:endParaRPr lang="en-US" dirty="0"/>
           </a:p>
         </p:txBody>
       </p:sp>
@@ -16560,7 +16542,6 @@
               <a:rPr lang="en-US" dirty="0"/>
               <a:t>and also as the default</a:t>
             </a:r>
-            <a:endParaRPr lang="en-US" dirty="0"/>
           </a:p>
         </p:txBody>
       </p:sp>
@@ -17606,10 +17587,22 @@
               <a:t>Node Version </a:t>
             </a:r>
             <a:r>
+              <a:rPr lang="en-US" smtClean="0">
+                <a:hlinkClick r:id="rId2"/>
+              </a:rPr>
+              <a:t>Manager </a:t>
+            </a:r>
+            <a:r>
+              <a:rPr lang="en-US" smtClean="0">
+                <a:hlinkClick r:id="rId2"/>
+              </a:rPr>
+              <a:t>(NVM</a:t>
+            </a:r>
+            <a:r>
               <a:rPr lang="en-US" dirty="0" smtClean="0">
                 <a:hlinkClick r:id="rId2"/>
               </a:rPr>
-              <a:t>Manager (RVM)</a:t>
+              <a:t>)</a:t>
             </a:r>
             <a:r>
               <a:rPr lang="en-US" dirty="0" smtClean="0"/>
@@ -17623,7 +17616,6 @@
               <a:rPr lang="en-US" dirty="0" smtClean="0"/>
               <a:t> versions</a:t>
             </a:r>
-            <a:endParaRPr lang="en-US" dirty="0" smtClean="0"/>
           </a:p>
           <a:p>
             <a:pPr lvl="1"/>
@@ -17649,7 +17641,6 @@
               <a:rPr lang="en-US" dirty="0" smtClean="0"/>
               <a:t>version 6.5.0</a:t>
             </a:r>
-            <a:endParaRPr lang="en-US" dirty="0" smtClean="0"/>
           </a:p>
           <a:p>
             <a:r>
@@ -17865,14 +17856,7 @@
                 <a:latin typeface="Courier"/>
                 <a:cs typeface="Courier"/>
               </a:rPr>
-              <a:t>--</a:t>
-            </a:r>
-            <a:r>
-              <a:rPr lang="en-US" sz="3200" dirty="0" smtClean="0">
-                <a:latin typeface="Courier"/>
-                <a:cs typeface="Courier"/>
-              </a:rPr>
-              <a:t>&gt;</a:t>
+              <a:t>--&gt;</a:t>
             </a:r>
             <a:endParaRPr lang="en-US" sz="3200" dirty="0">
               <a:latin typeface="Courier"/>
@@ -18164,7 +18148,6 @@
               <a:rPr lang="en-US" dirty="0" smtClean="0"/>
               <a:t>with the console in a browser</a:t>
             </a:r>
-            <a:endParaRPr lang="en-US" dirty="0" smtClean="0"/>
           </a:p>
           <a:p>
             <a:r>
@@ -18207,14 +18190,7 @@
                 <a:latin typeface="Courier"/>
                 <a:cs typeface="Courier"/>
               </a:rPr>
-              <a:t>node</a:t>
-            </a:r>
-            <a:r>
-              <a:rPr lang="en-US" dirty="0" smtClean="0">
-                <a:latin typeface="Courier"/>
-                <a:cs typeface="Courier"/>
-              </a:rPr>
-              <a:t> </a:t>
+              <a:t>node </a:t>
             </a:r>
             <a:r>
               <a:rPr lang="en-US" dirty="0" err="1" smtClean="0">

</xml_diff>